<commit_message>
ppt correction added new Gotchas as MysteryGotchas.html
</commit_message>
<xml_diff>
--- a/Js In Nutshell.pptx
+++ b/Js In Nutshell.pptx
@@ -275,7 +275,7 @@
           <a:p>
             <a:fld id="{EC13577B-6902-467D-A26C-08A0DD5E4E03}" type="datetimeFigureOut">
               <a:rPr lang="en-US" smtClean="0"/>
-              <a:t>8/24/2015</a:t>
+              <a:t>8/27/2015</a:t>
             </a:fld>
             <a:endParaRPr lang="en-US"/>
           </a:p>
@@ -696,6 +696,13 @@
               <a:rPr lang="en-US" baseline="0" dirty="0" smtClean="0"/>
               <a:t>Read role  of new</a:t>
             </a:r>
+            <a:br>
+              <a:rPr lang="en-US" baseline="0" dirty="0" smtClean="0"/>
+            </a:br>
+            <a:r>
+              <a:rPr lang="en-US" baseline="0" dirty="0" smtClean="0"/>
+              <a:t>----please refer samples---------</a:t>
+            </a:r>
           </a:p>
           <a:p>
             <a:r>
@@ -862,15 +869,6 @@
               </a:rPr>
               <a:t>///can refer this example in code</a:t>
             </a:r>
-            <a:endParaRPr lang="en-US" sz="1200" b="0" i="0" kern="1200" dirty="0" smtClean="0">
-              <a:solidFill>
-                <a:schemeClr val="tx1"/>
-              </a:solidFill>
-              <a:effectLst/>
-              <a:latin typeface="+mn-lt"/>
-              <a:ea typeface="+mn-ea"/>
-              <a:cs typeface="+mn-cs"/>
-            </a:endParaRPr>
           </a:p>
           <a:p>
             <a:r>
@@ -1201,29 +1199,8 @@
                 <a:ea typeface="+mn-ea"/>
                 <a:cs typeface="+mn-cs"/>
               </a:rPr>
-              <a:t>http://</a:t>
-            </a:r>
-            <a:r>
-              <a:rPr lang="en-US" sz="1200" kern="1200" dirty="0" smtClean="0">
-                <a:solidFill>
-                  <a:schemeClr val="tx1"/>
-                </a:solidFill>
-                <a:effectLst/>
-                <a:latin typeface="+mn-lt"/>
-                <a:ea typeface="+mn-ea"/>
-                <a:cs typeface="+mn-cs"/>
-              </a:rPr>
-              <a:t>javascriptissexy.com/understand-javascripts-this-with-clarity-and-master-it]</a:t>
-            </a:r>
-            <a:endParaRPr lang="en-US" sz="1200" kern="1200" dirty="0" smtClean="0">
-              <a:solidFill>
-                <a:schemeClr val="tx1"/>
-              </a:solidFill>
-              <a:effectLst/>
-              <a:latin typeface="+mn-lt"/>
-              <a:ea typeface="+mn-ea"/>
-              <a:cs typeface="+mn-cs"/>
-            </a:endParaRPr>
+              <a:t>http://javascriptissexy.com/understand-javascripts-this-with-clarity-and-master-it]</a:t>
+            </a:r>
           </a:p>
           <a:p>
             <a:pPr marL="0" marR="0" indent="0" algn="l" defTabSz="914400" rtl="0" eaLnBrk="1" fontAlgn="auto" latinLnBrk="0" hangingPunct="1">
@@ -1468,7 +1445,15 @@
             </a:br>
             <a:r>
               <a:rPr lang="en-US" baseline="0" dirty="0" smtClean="0"/>
-              <a:t>create no. by all three methods ; show constructors; print them ; show there types</a:t>
+              <a:t>create no. by all three methods ; see constructors; print them ; see there types using </a:t>
+            </a:r>
+            <a:r>
+              <a:rPr lang="en-US" baseline="0" dirty="0" err="1" smtClean="0"/>
+              <a:t>typeof</a:t>
+            </a:r>
+            <a:r>
+              <a:rPr lang="en-US" baseline="0" dirty="0" smtClean="0"/>
+              <a:t> operator</a:t>
             </a:r>
           </a:p>
           <a:p>
@@ -1477,7 +1462,7 @@
           <a:p>
             <a:r>
               <a:rPr lang="en-US" baseline="0" dirty="0" smtClean="0"/>
-              <a:t>Show added prop because of object constructor and no properties of constructor Number() without new</a:t>
+              <a:t>Complex type have Dynamic typing because of object constructor and no dynamic typing on primitive types</a:t>
             </a:r>
             <a:endParaRPr lang="en-US" dirty="0"/>
           </a:p>
@@ -1579,11 +1564,50 @@
           <a:p>
             <a:r>
               <a:rPr lang="en-US" sz="1200" dirty="0" smtClean="0"/>
-              <a:t>-</a:t>
-            </a:r>
+              <a:t>Also visit this link </a:t>
+            </a:r>
+            <a:r>
+              <a:rPr lang="en-US" sz="1200" kern="1200" dirty="0" smtClean="0">
+                <a:solidFill>
+                  <a:schemeClr val="tx1"/>
+                </a:solidFill>
+                <a:latin typeface="+mn-lt"/>
+                <a:ea typeface="+mn-ea"/>
+                <a:cs typeface="+mn-cs"/>
+              </a:rPr>
+              <a:t>////////////</a:t>
+            </a:r>
+            <a:r>
+              <a:rPr lang="en-US" sz="1200" kern="1200" dirty="0" err="1" smtClean="0">
+                <a:solidFill>
+                  <a:schemeClr val="tx1"/>
+                </a:solidFill>
+                <a:latin typeface="+mn-lt"/>
+                <a:ea typeface="+mn-ea"/>
+                <a:cs typeface="+mn-cs"/>
+              </a:rPr>
+              <a:t>Inhertitance</a:t>
+            </a:r>
+            <a:r>
+              <a:rPr lang="en-US" sz="1200" kern="1200" dirty="0" smtClean="0">
+                <a:solidFill>
+                  <a:schemeClr val="tx1"/>
+                </a:solidFill>
+                <a:latin typeface="+mn-lt"/>
+                <a:ea typeface="+mn-ea"/>
+                <a:cs typeface="+mn-cs"/>
+              </a:rPr>
+              <a:t> explained https://skimmable-videos.herokuapp.com/show/558f4dc9c240320300d8ef34 /////////</a:t>
+            </a:r>
+            <a:endParaRPr lang="en-US" sz="1200" dirty="0" smtClean="0"/>
+          </a:p>
+          <a:p>
+            <a:endParaRPr lang="en-US" sz="1200" dirty="0" smtClean="0"/>
+          </a:p>
+          <a:p>
             <a:r>
               <a:rPr lang="en-US" sz="1200" dirty="0" smtClean="0"/>
-              <a:t>attach properties and methods on this prototype property when you want to implement inheritance.</a:t>
+              <a:t>-attach properties and methods on this prototype property when you want to implement inheritance.</a:t>
             </a:r>
             <a:endParaRPr lang="en-US" dirty="0" smtClean="0"/>
           </a:p>
@@ -1881,15 +1905,7 @@
           <a:p>
             <a:r>
               <a:rPr lang="en-US" dirty="0" smtClean="0"/>
-              <a:t>Show </a:t>
-            </a:r>
-            <a:r>
-              <a:rPr lang="en-US" dirty="0" smtClean="0"/>
-              <a:t>example object</a:t>
-            </a:r>
-            <a:r>
-              <a:rPr lang="en-US" dirty="0" smtClean="0"/>
-              <a:t/>
+              <a:t>Show example object</a:t>
             </a:r>
             <a:br>
               <a:rPr lang="en-US" dirty="0" smtClean="0"/>
@@ -1900,15 +1916,7 @@
             </a:r>
             <a:r>
               <a:rPr lang="en-US" baseline="0" dirty="0" smtClean="0"/>
-              <a:t> is not a </a:t>
-            </a:r>
-            <a:r>
-              <a:rPr lang="en-US" baseline="0" dirty="0" smtClean="0"/>
-              <a:t>strongly </a:t>
-            </a:r>
-            <a:r>
-              <a:rPr lang="en-US" baseline="0" dirty="0" smtClean="0"/>
-              <a:t>typed language but it still has some types as we already discussed and it gets very difficult at times to identify the type of data you are dealing </a:t>
+              <a:t> is not a strongly typed language but it still has some types as we already discussed and it gets very difficult at times to identify the type of data you are dealing </a:t>
             </a:r>
             <a:r>
               <a:rPr lang="en-US" baseline="0" dirty="0" err="1" smtClean="0"/>
@@ -2113,13 +2121,17 @@
             </a:r>
             <a:r>
               <a:rPr lang="en-US" baseline="0" dirty="0" smtClean="0"/>
-              <a:t> way is to check through </a:t>
-            </a:r>
-            <a:r>
-              <a:rPr lang="en-US" baseline="0" smtClean="0"/>
-              <a:t>console using if</a:t>
-            </a:r>
-            <a:endParaRPr lang="en-US"/>
+              <a:t> way is to check through console using if(</a:t>
+            </a:r>
+            <a:r>
+              <a:rPr lang="en-US" baseline="0" dirty="0" err="1" smtClean="0"/>
+              <a:t>val</a:t>
+            </a:r>
+            <a:r>
+              <a:rPr lang="en-US" baseline="0" dirty="0" smtClean="0"/>
+              <a:t>){}</a:t>
+            </a:r>
+            <a:endParaRPr lang="en-US" dirty="0"/>
           </a:p>
         </p:txBody>
       </p:sp>
@@ -2532,15 +2544,7 @@
             </a:r>
             <a:r>
               <a:rPr lang="en-US" baseline="0" dirty="0" smtClean="0"/>
-              <a:t> </a:t>
-            </a:r>
-            <a:r>
-              <a:rPr lang="en-US" baseline="0" dirty="0" err="1" smtClean="0"/>
-              <a:t>javascript</a:t>
-            </a:r>
-            <a:r>
-              <a:rPr lang="en-US" baseline="0" dirty="0" smtClean="0"/>
-              <a:t> was a nightmare for me, because I every time I had to work in </a:t>
+              <a:t> JavaScript was a nightmare for me, because  every time I had to work in </a:t>
             </a:r>
             <a:r>
               <a:rPr lang="en-US" baseline="0" dirty="0" err="1" smtClean="0"/>
@@ -2847,7 +2851,38 @@
           <a:p>
             <a:r>
               <a:rPr lang="en-IN" dirty="0" smtClean="0"/>
-              <a:t>Refer example</a:t>
+              <a:t>Refer example.</a:t>
+            </a:r>
+            <a:br>
+              <a:rPr lang="en-IN" dirty="0" smtClean="0"/>
+            </a:br>
+            <a:r>
+              <a:rPr lang="en-IN" dirty="0" smtClean="0"/>
+              <a:t>Can cause</a:t>
+            </a:r>
+            <a:r>
+              <a:rPr lang="en-IN" baseline="0" dirty="0" smtClean="0"/>
+              <a:t> memory leaks if inner function that hold reference to outer scope do not release </a:t>
+            </a:r>
+            <a:r>
+              <a:rPr lang="en-IN" baseline="0" smtClean="0"/>
+              <a:t>that variable , Closures </a:t>
+            </a:r>
+            <a:r>
+              <a:rPr lang="en-IN" baseline="0" dirty="0" smtClean="0"/>
+              <a:t>are </a:t>
+            </a:r>
+            <a:r>
+              <a:rPr lang="en-IN" baseline="0" smtClean="0"/>
+              <a:t>very power full </a:t>
+            </a:r>
+            <a:r>
+              <a:rPr lang="en-IN" baseline="0" dirty="0" smtClean="0"/>
+              <a:t>but you need to use them efficiently because </a:t>
+            </a:r>
+            <a:r>
+              <a:rPr lang="en-IN" baseline="0" dirty="0" err="1" smtClean="0"/>
+              <a:t>pto</a:t>
             </a:r>
             <a:endParaRPr lang="en-IN" dirty="0"/>
           </a:p>
@@ -3035,15 +3070,7 @@
             </a:r>
             <a:r>
               <a:rPr lang="en-US" baseline="0" dirty="0" smtClean="0"/>
-              <a:t> I realized was that it was not </a:t>
-            </a:r>
-            <a:r>
-              <a:rPr lang="en-US" baseline="0" dirty="0" smtClean="0"/>
-              <a:t>JavaScript’s fault </a:t>
-            </a:r>
-            <a:r>
-              <a:rPr lang="en-US" baseline="0" dirty="0" smtClean="0"/>
-              <a:t>it was actually my fault because I directly jumped into the language without understanding the basics and semantics of </a:t>
+              <a:t> I realized was that it was not JavaScript’s fault it was actually my fault because I directly jumped into the language without understanding the basics and semantics of </a:t>
             </a:r>
             <a:r>
               <a:rPr lang="en-US" baseline="0" dirty="0" err="1" smtClean="0"/>
@@ -3175,124 +3202,92 @@
             </a:r>
             <a:r>
               <a:rPr lang="en-US" baseline="0" dirty="0" smtClean="0"/>
-              <a:t> was created by him in 1995 at </a:t>
-            </a:r>
-            <a:r>
-              <a:rPr lang="en-US" baseline="0" dirty="0" smtClean="0"/>
-              <a:t>Netscape</a:t>
-            </a:r>
-            <a:r>
-              <a:rPr lang="en-US" baseline="0" dirty="0" smtClean="0"/>
-              <a:t>, currently Brendan  is working at Mozilla and he is also the co founder of Mozilla. </a:t>
-            </a:r>
-          </a:p>
-          <a:p>
-            <a:r>
-              <a:rPr lang="en-US" baseline="0" dirty="0" smtClean="0"/>
-              <a:t>Well after creating </a:t>
-            </a:r>
-            <a:r>
-              <a:rPr lang="en-US" baseline="0" dirty="0" err="1" smtClean="0"/>
-              <a:t>Js</a:t>
-            </a:r>
-            <a:r>
-              <a:rPr lang="en-US" baseline="0" dirty="0" smtClean="0"/>
-              <a:t> </a:t>
-            </a:r>
-            <a:r>
-              <a:rPr lang="en-US" baseline="0" dirty="0" smtClean="0"/>
-              <a:t>it was handed to the </a:t>
-            </a:r>
-            <a:r>
-              <a:rPr lang="en-US" baseline="0" dirty="0" err="1" smtClean="0"/>
-              <a:t>Echma</a:t>
-            </a:r>
-            <a:r>
-              <a:rPr lang="en-US" baseline="0" dirty="0" smtClean="0"/>
-              <a:t> organization </a:t>
-            </a:r>
-            <a:r>
-              <a:rPr lang="en-US" baseline="0" dirty="0" smtClean="0"/>
-              <a:t>for </a:t>
-            </a:r>
-            <a:r>
-              <a:rPr lang="en-US" baseline="0" dirty="0" smtClean="0"/>
-              <a:t>standardization </a:t>
-            </a:r>
-            <a:r>
-              <a:rPr lang="en-US" baseline="0" dirty="0" smtClean="0"/>
-              <a:t>and I always that that </a:t>
-            </a:r>
-            <a:r>
-              <a:rPr lang="en-US" baseline="0" dirty="0" err="1" smtClean="0"/>
-              <a:t>js</a:t>
-            </a:r>
-            <a:r>
-              <a:rPr lang="en-US" baseline="0" dirty="0" smtClean="0"/>
-              <a:t> has no standards., </a:t>
-            </a:r>
-          </a:p>
-          <a:p>
-            <a:r>
-              <a:rPr lang="en-US" baseline="0" dirty="0" smtClean="0"/>
-              <a:t>after that it was named as ECHMA script so basically the original name of </a:t>
-            </a:r>
-            <a:r>
-              <a:rPr lang="en-US" baseline="0" dirty="0" err="1" smtClean="0"/>
-              <a:t>js</a:t>
-            </a:r>
-            <a:r>
-              <a:rPr lang="en-US" baseline="0" dirty="0" smtClean="0"/>
-              <a:t> was ECHMA but it is well known as </a:t>
-            </a:r>
-            <a:r>
-              <a:rPr lang="en-US" baseline="0" dirty="0" smtClean="0"/>
-              <a:t>JavaScript </a:t>
-            </a:r>
-            <a:r>
-              <a:rPr lang="en-US" baseline="0" dirty="0" smtClean="0"/>
-              <a:t>and</a:t>
-            </a:r>
-          </a:p>
-          <a:p>
-            <a:r>
-              <a:rPr lang="en-US" baseline="0" dirty="0" smtClean="0"/>
-              <a:t> the reason being first the author thought the name ECHA sounds like a skin disease and </a:t>
-            </a:r>
-          </a:p>
-          <a:p>
-            <a:r>
-              <a:rPr lang="en-US" baseline="0" dirty="0" smtClean="0"/>
-              <a:t>second when he created the language he was actually briefed to create a language similar to JAVA but would run on the client .</a:t>
-            </a:r>
-          </a:p>
-          <a:p>
-            <a:r>
-              <a:rPr lang="en-US" baseline="0" dirty="0" err="1" smtClean="0"/>
-              <a:t>Js</a:t>
-            </a:r>
-            <a:r>
-              <a:rPr lang="en-US" baseline="0" dirty="0" smtClean="0"/>
-              <a:t> is not only for web based it is also used in pdf and </a:t>
-            </a:r>
-            <a:r>
-              <a:rPr lang="en-US" baseline="0" dirty="0" err="1" smtClean="0"/>
-              <a:t>vm’s</a:t>
-            </a:r>
-            <a:r>
-              <a:rPr lang="en-US" baseline="0" dirty="0" smtClean="0"/>
-              <a:t> as well</a:t>
+              <a:t> was created by him in 1995 at Netscape, currently Brendan  is working at Mozilla and he is also the co founder of Mozilla. </a:t>
             </a:r>
             <a:br>
               <a:rPr lang="en-US" baseline="0" dirty="0" smtClean="0"/>
             </a:br>
+            <a:endParaRPr lang="en-US" baseline="0" dirty="0" smtClean="0"/>
+          </a:p>
+          <a:p>
+            <a:r>
+              <a:rPr lang="en-US" baseline="0" dirty="0" smtClean="0"/>
+              <a:t>Well after creating </a:t>
+            </a:r>
             <a:r>
               <a:rPr lang="en-US" baseline="0" dirty="0" err="1" smtClean="0"/>
-              <a:t>Javascript</a:t>
+              <a:t>Js</a:t>
             </a:r>
             <a:r>
               <a:rPr lang="en-US" baseline="0" dirty="0" smtClean="0"/>
-              <a:t> is not only for web </a:t>
+              <a:t> it was handed to the </a:t>
+            </a:r>
+            <a:r>
+              <a:rPr lang="en-US" baseline="0" dirty="0" err="1" smtClean="0"/>
+              <a:t>Echma</a:t>
+            </a:r>
+            <a:r>
+              <a:rPr lang="en-US" baseline="0" dirty="0" smtClean="0"/>
+              <a:t> organization for standardization and I always that that </a:t>
+            </a:r>
+            <a:r>
+              <a:rPr lang="en-US" baseline="0" dirty="0" err="1" smtClean="0"/>
+              <a:t>js</a:t>
+            </a:r>
+            <a:r>
+              <a:rPr lang="en-US" baseline="0" dirty="0" smtClean="0"/>
+              <a:t> has no standards., </a:t>
+            </a:r>
+          </a:p>
+          <a:p>
+            <a:r>
+              <a:rPr lang="en-US" baseline="0" dirty="0" smtClean="0"/>
+              <a:t>after that it was named as ECHMA script so basically the original name of </a:t>
+            </a:r>
+            <a:r>
+              <a:rPr lang="en-US" baseline="0" dirty="0" err="1" smtClean="0"/>
+              <a:t>js</a:t>
+            </a:r>
+            <a:r>
+              <a:rPr lang="en-US" baseline="0" dirty="0" smtClean="0"/>
+              <a:t> was ECHMA but it is well known as JavaScript and</a:t>
+            </a:r>
+          </a:p>
+          <a:p>
+            <a:r>
+              <a:rPr lang="en-US" baseline="0" dirty="0" smtClean="0"/>
+              <a:t> the reason being first the author thought the name ECHA sounds like a skin disease and </a:t>
+            </a:r>
+          </a:p>
+          <a:p>
+            <a:r>
+              <a:rPr lang="en-US" baseline="0" dirty="0" smtClean="0"/>
+              <a:t>second when he created the language he was actually briefed to create a language similar to JAVA but would run on the client .</a:t>
+            </a:r>
+          </a:p>
+          <a:p>
+            <a:r>
+              <a:rPr lang="en-US" baseline="0" dirty="0" err="1" smtClean="0"/>
+              <a:t>Js</a:t>
+            </a:r>
+            <a:r>
+              <a:rPr lang="en-US" baseline="0" dirty="0" smtClean="0"/>
+              <a:t> is not only for web based it is also used in pdf and </a:t>
+            </a:r>
+            <a:r>
+              <a:rPr lang="en-US" baseline="0" dirty="0" err="1" smtClean="0"/>
+              <a:t>vm’s</a:t>
+            </a:r>
+            <a:r>
+              <a:rPr lang="en-US" baseline="0" dirty="0" smtClean="0"/>
+              <a:t> as well</a:t>
+            </a:r>
+            <a:br>
+              <a:rPr lang="en-US" baseline="0" dirty="0" smtClean="0"/>
+            </a:br>
+            <a:r>
+              <a:rPr lang="en-US" baseline="0" dirty="0" smtClean="0"/>
+              <a:t>JavaScript is not only for web </a:t>
             </a:r>
             <a:endParaRPr lang="en-US" dirty="0"/>
           </a:p>
@@ -3473,11 +3468,11 @@
           <a:p>
             <a:r>
               <a:rPr lang="en-US" sz="1200" baseline="0" dirty="0" smtClean="0"/>
-              <a:t>Are </a:t>
+              <a:t>Are JavaScript </a:t>
             </a:r>
             <a:r>
               <a:rPr lang="en-US" sz="1200" baseline="0" dirty="0" err="1" smtClean="0"/>
-              <a:t>jjavscript</a:t>
+              <a:t>mein</a:t>
             </a:r>
             <a:r>
               <a:rPr lang="en-US" sz="1200" baseline="0" dirty="0" smtClean="0"/>
@@ -3485,7 +3480,7 @@
             </a:r>
             <a:r>
               <a:rPr lang="en-US" sz="1200" baseline="0" dirty="0" err="1" smtClean="0"/>
-              <a:t>mein</a:t>
+              <a:t>kuch</a:t>
             </a:r>
             <a:r>
               <a:rPr lang="en-US" sz="1200" baseline="0" dirty="0" smtClean="0"/>
@@ -3493,7 +3488,7 @@
             </a:r>
             <a:r>
               <a:rPr lang="en-US" sz="1200" baseline="0" dirty="0" err="1" smtClean="0"/>
-              <a:t>kuch</a:t>
+              <a:t>nhi</a:t>
             </a:r>
             <a:r>
               <a:rPr lang="en-US" sz="1200" baseline="0" dirty="0" smtClean="0"/>
@@ -3501,7 +3496,15 @@
             </a:r>
             <a:r>
               <a:rPr lang="en-US" sz="1200" baseline="0" dirty="0" err="1" smtClean="0"/>
-              <a:t>nhi</a:t>
+              <a:t>rakh</a:t>
+            </a:r>
+            <a:r>
+              <a:rPr lang="en-US" sz="1200" baseline="0" dirty="0" smtClean="0"/>
+              <a:t> learn JQuery everything is JQuery today, even in my firs company my mentor told me the same thing (</a:t>
+            </a:r>
+            <a:r>
+              <a:rPr lang="en-US" sz="1200" baseline="0" dirty="0" err="1" smtClean="0"/>
+              <a:t>img</a:t>
             </a:r>
             <a:r>
               <a:rPr lang="en-US" sz="1200" baseline="0" dirty="0" smtClean="0"/>
@@ -3509,38 +3512,6 @@
             </a:r>
             <a:r>
               <a:rPr lang="en-US" sz="1200" baseline="0" dirty="0" err="1" smtClean="0"/>
-              <a:t>rakh</a:t>
-            </a:r>
-            <a:r>
-              <a:rPr lang="en-US" sz="1200" baseline="0" dirty="0" smtClean="0"/>
-              <a:t> learn </a:t>
-            </a:r>
-            <a:r>
-              <a:rPr lang="en-US" sz="1200" baseline="0" dirty="0" err="1" smtClean="0"/>
-              <a:t>jquery</a:t>
-            </a:r>
-            <a:r>
-              <a:rPr lang="en-US" sz="1200" baseline="0" dirty="0" smtClean="0"/>
-              <a:t> everything is </a:t>
-            </a:r>
-            <a:r>
-              <a:rPr lang="en-US" sz="1200" baseline="0" dirty="0" err="1" smtClean="0"/>
-              <a:t>jquery</a:t>
-            </a:r>
-            <a:r>
-              <a:rPr lang="en-US" sz="1200" baseline="0" dirty="0" smtClean="0"/>
-              <a:t> today even in my firs company my mentor told me the same thing (</a:t>
-            </a:r>
-            <a:r>
-              <a:rPr lang="en-US" sz="1200" baseline="0" dirty="0" err="1" smtClean="0"/>
-              <a:t>img</a:t>
-            </a:r>
-            <a:r>
-              <a:rPr lang="en-US" sz="1200" baseline="0" dirty="0" smtClean="0"/>
-              <a:t> </a:t>
-            </a:r>
-            <a:r>
-              <a:rPr lang="en-US" sz="1200" baseline="0" dirty="0" err="1" smtClean="0"/>
               <a:t>pto</a:t>
             </a:r>
             <a:r>
@@ -3550,13 +3521,6 @@
           </a:p>
           <a:p>
             <a:endParaRPr lang="en-US" sz="1200" dirty="0" smtClean="0"/>
-          </a:p>
-          <a:p>
-            <a:r>
-              <a:rPr lang="en-US" sz="1200" dirty="0" smtClean="0"/>
-              <a:t>Object based</a:t>
-            </a:r>
-            <a:endParaRPr lang="en-US" dirty="0"/>
           </a:p>
         </p:txBody>
       </p:sp>
@@ -3743,6 +3707,12 @@
             <a:r>
               <a:rPr lang="en-US" baseline="0" dirty="0" smtClean="0"/>
               <a:t> is a kind of container and you can add properties and methods on them .</a:t>
+            </a:r>
+          </a:p>
+          <a:p>
+            <a:r>
+              <a:rPr lang="en-US" baseline="0" dirty="0" smtClean="0"/>
+              <a:t>Refer sample</a:t>
             </a:r>
           </a:p>
           <a:p>
@@ -4189,7 +4159,7 @@
           <a:p>
             <a:fld id="{8BEEBAAA-29B5-4AF5-BC5F-7E580C29002D}" type="datetimeFigureOut">
               <a:rPr lang="en-US" smtClean="0"/>
-              <a:t>8/24/2015</a:t>
+              <a:t>8/27/2015</a:t>
             </a:fld>
             <a:endParaRPr lang="en-US"/>
           </a:p>
@@ -4469,7 +4439,7 @@
           <a:p>
             <a:fld id="{8BEEBAAA-29B5-4AF5-BC5F-7E580C29002D}" type="datetimeFigureOut">
               <a:rPr lang="en-US" smtClean="0"/>
-              <a:t>8/24/2015</a:t>
+              <a:t>8/27/2015</a:t>
             </a:fld>
             <a:endParaRPr lang="en-US"/>
           </a:p>
@@ -4754,7 +4724,7 @@
           <a:p>
             <a:fld id="{8BEEBAAA-29B5-4AF5-BC5F-7E580C29002D}" type="datetimeFigureOut">
               <a:rPr lang="en-US" smtClean="0"/>
-              <a:t>8/24/2015</a:t>
+              <a:t>8/27/2015</a:t>
             </a:fld>
             <a:endParaRPr lang="en-US"/>
           </a:p>
@@ -5118,7 +5088,7 @@
           <a:p>
             <a:fld id="{8BEEBAAA-29B5-4AF5-BC5F-7E580C29002D}" type="datetimeFigureOut">
               <a:rPr lang="en-US" smtClean="0"/>
-              <a:t>8/24/2015</a:t>
+              <a:t>8/27/2015</a:t>
             </a:fld>
             <a:endParaRPr lang="en-US"/>
           </a:p>
@@ -5421,7 +5391,7 @@
           <a:p>
             <a:fld id="{8BEEBAAA-29B5-4AF5-BC5F-7E580C29002D}" type="datetimeFigureOut">
               <a:rPr lang="en-US" smtClean="0"/>
-              <a:t>8/24/2015</a:t>
+              <a:t>8/27/2015</a:t>
             </a:fld>
             <a:endParaRPr lang="en-US"/>
           </a:p>
@@ -5939,7 +5909,7 @@
           <a:p>
             <a:fld id="{8BEEBAAA-29B5-4AF5-BC5F-7E580C29002D}" type="datetimeFigureOut">
               <a:rPr lang="en-US" smtClean="0"/>
-              <a:t>8/24/2015</a:t>
+              <a:t>8/27/2015</a:t>
             </a:fld>
             <a:endParaRPr lang="en-US"/>
           </a:p>
@@ -6587,7 +6557,7 @@
           <a:p>
             <a:fld id="{8BEEBAAA-29B5-4AF5-BC5F-7E580C29002D}" type="datetimeFigureOut">
               <a:rPr lang="en-US" smtClean="0"/>
-              <a:t>8/24/2015</a:t>
+              <a:t>8/27/2015</a:t>
             </a:fld>
             <a:endParaRPr lang="en-US"/>
           </a:p>
@@ -6815,7 +6785,7 @@
           <a:p>
             <a:fld id="{8BEEBAAA-29B5-4AF5-BC5F-7E580C29002D}" type="datetimeFigureOut">
               <a:rPr lang="en-US" smtClean="0"/>
-              <a:t>8/24/2015</a:t>
+              <a:t>8/27/2015</a:t>
             </a:fld>
             <a:endParaRPr lang="en-US"/>
           </a:p>
@@ -6959,7 +6929,7 @@
           <a:p>
             <a:fld id="{8BEEBAAA-29B5-4AF5-BC5F-7E580C29002D}" type="datetimeFigureOut">
               <a:rPr lang="en-US" smtClean="0"/>
-              <a:t>8/24/2015</a:t>
+              <a:t>8/27/2015</a:t>
             </a:fld>
             <a:endParaRPr lang="en-US"/>
           </a:p>
@@ -7299,7 +7269,7 @@
           <a:p>
             <a:fld id="{8BEEBAAA-29B5-4AF5-BC5F-7E580C29002D}" type="datetimeFigureOut">
               <a:rPr lang="en-US" smtClean="0"/>
-              <a:t>8/24/2015</a:t>
+              <a:t>8/27/2015</a:t>
             </a:fld>
             <a:endParaRPr lang="en-US"/>
           </a:p>
@@ -7559,7 +7529,7 @@
           <a:p>
             <a:fld id="{8BEEBAAA-29B5-4AF5-BC5F-7E580C29002D}" type="datetimeFigureOut">
               <a:rPr lang="en-US" smtClean="0"/>
-              <a:t>8/24/2015</a:t>
+              <a:t>8/27/2015</a:t>
             </a:fld>
             <a:endParaRPr lang="en-US"/>
           </a:p>
@@ -7775,7 +7745,7 @@
           <a:p>
             <a:fld id="{8BEEBAAA-29B5-4AF5-BC5F-7E580C29002D}" type="datetimeFigureOut">
               <a:rPr lang="en-US" smtClean="0"/>
-              <a:t>8/24/2015</a:t>
+              <a:t>8/27/2015</a:t>
             </a:fld>
             <a:endParaRPr lang="en-US"/>
           </a:p>
@@ -8197,7 +8167,7 @@
           <a:p>
             <a:r>
               <a:rPr lang="en-US" dirty="0" smtClean="0"/>
-              <a:t>Practical HTML5</a:t>
+              <a:t>JavaScript Fundamental Basics</a:t>
             </a:r>
             <a:endParaRPr lang="en-US" dirty="0"/>
           </a:p>
@@ -8227,20 +8197,14 @@
           <a:p>
             <a:r>
               <a:rPr lang="en-US" b="1" dirty="0" smtClean="0"/>
-              <a:t>Fundamentals of HTML, CSS and JavaScript</a:t>
-            </a:r>
-          </a:p>
-          <a:p>
-            <a:r>
-              <a:rPr lang="en-US" b="1" dirty="0" smtClean="0"/>
-              <a:t>Ashish</a:t>
+              <a:t>- Vasu Nagpal</a:t>
             </a:r>
           </a:p>
         </p:txBody>
       </p:sp>
       <p:pic>
         <p:nvPicPr>
-          <p:cNvPr id="4" name="Picture 3"/>
+          <p:cNvPr id="5" name="Picture 4"/>
           <p:cNvPicPr>
             <a:picLocks noChangeAspect="1"/>
           </p:cNvPicPr>
@@ -8260,8 +8224,8 @@
         </p:blipFill>
         <p:spPr>
           <a:xfrm>
-            <a:off x="10038806" y="5110609"/>
-            <a:ext cx="1530927" cy="1530927"/>
+            <a:off x="9945665" y="4980462"/>
+            <a:ext cx="1773809" cy="1773809"/>
           </a:xfrm>
           <a:prstGeom prst="rect">
             <a:avLst/>
@@ -9152,12 +9116,17 @@
             </a:pPr>
             <a:r>
               <a:rPr lang="en-US" sz="2400" dirty="0"/>
-              <a:t>Number() , String() and Boolean() when invoked without new keyword creates primitive </a:t>
-            </a:r>
-            <a:r>
-              <a:rPr lang="en-US" sz="2400" dirty="0" smtClean="0"/>
-              <a:t>types</a:t>
-            </a:r>
+              <a:t>Number() , String() and Boolean() when invoked without new keyword </a:t>
+            </a:r>
+            <a:r>
+              <a:rPr lang="en-US" sz="2400"/>
+              <a:t>creates </a:t>
+            </a:r>
+            <a:r>
+              <a:rPr lang="en-US" sz="2400" smtClean="0"/>
+              <a:t>complex types</a:t>
+            </a:r>
+            <a:endParaRPr lang="en-US" sz="2400" dirty="0" smtClean="0"/>
           </a:p>
           <a:p>
             <a:pPr marL="342900" indent="-342900">
@@ -12792,7 +12761,7 @@
         </p:spPr>
         <p:txBody>
           <a:bodyPr>
-            <a:normAutofit fontScale="47500" lnSpcReduction="20000"/>
+            <a:normAutofit fontScale="40000" lnSpcReduction="20000"/>
           </a:bodyPr>
           <a:lstStyle/>
           <a:p>
@@ -12861,7 +12830,14 @@
               </a:rPr>
               <a:t>JavaScript Succinctly </a:t>
             </a:r>
-            <a:endParaRPr lang="en-US" sz="3800" dirty="0" smtClean="0"/>
+            <a:endParaRPr lang="en-US" sz="3800" dirty="0"/>
+          </a:p>
+          <a:p>
+            <a:pPr marL="1257300" lvl="1" indent="-571500"/>
+            <a:r>
+              <a:rPr lang="en-US" sz="3800" dirty="0" smtClean="0"/>
+              <a:t>MDN</a:t>
+            </a:r>
           </a:p>
           <a:p>
             <a:pPr marL="571500" indent="-571500">
@@ -13282,15 +13258,7 @@
             </a:r>
             <a:r>
               <a:rPr lang="en-US" b="1" dirty="0" smtClean="0"/>
-              <a:t>This is Magic</a:t>
-            </a:r>
-            <a:r>
-              <a:rPr lang="en-US" b="1" dirty="0" smtClean="0"/>
-              <a:t> </a:t>
-            </a:r>
-            <a:r>
-              <a:rPr lang="en-US" b="1" dirty="0" smtClean="0"/>
-              <a:t>:</a:t>
+              <a:t>This is Magic :</a:t>
             </a:r>
             <a:r>
               <a:rPr lang="en-US" b="1" dirty="0" smtClean="0">

</xml_diff>